<commit_message>
Usando un template para crear las diapositivas
</commit_message>
<xml_diff>
--- a/app/temp/output.pptx
+++ b/app/temp/output.pptx
@@ -15848,7 +15848,7 @@
           <a:lstStyle/>
           <a:p>
             <a:r>
-              <a:t>Definición de computadora</a:t>
+              <a:t>Definición de Videojuegos</a:t>
             </a:r>
           </a:p>
         </p:txBody>
@@ -15867,40 +15867,16 @@
         <p:txBody>
           <a:bodyPr/>
           <a:lstStyle/>
-          <a:p/>
-        </p:txBody>
-      </p:sp>
-      <p:sp>
-        <p:nvSpPr>
-          <p:cNvPr id="4" name="TextBox 3"/>
-          <p:cNvSpPr txBox="1"/>
-          <p:nvPr/>
-        </p:nvSpPr>
-        <p:spPr>
-          <a:xfrm>
-            <a:off x="914400" y="1371600"/>
-            <a:ext cx="7315200" cy="4572000"/>
-          </a:xfrm>
-          <a:prstGeom prst="rect">
-            <a:avLst/>
-          </a:prstGeom>
-          <a:noFill/>
-        </p:spPr>
-        <p:txBody>
-          <a:bodyPr wrap="square">
-            <a:spAutoFit/>
-          </a:bodyPr>
-          <a:lstStyle/>
           <a:p>
             <a:r>
-              <a:t>Una computadora es un dispositivo electrónico programable que realiza cálculos y procesa información.</a:t>
+              <a:t>Los videojuegos son una forma de entretenimiento interactivo que involucra el uso de imágenes generadas por computadora y un controlador de algún tipo.</a:t>
             </a:r>
           </a:p>
         </p:txBody>
       </p:sp>
       <p:pic>
         <p:nvPicPr>
-          <p:cNvPr id="5" name="Picture 4" descr="temp.jpg"/>
+          <p:cNvPr id="4" name="Picture 3" descr="temp.jpg"/>
           <p:cNvPicPr>
             <a:picLocks noChangeAspect="1"/>
           </p:cNvPicPr>
@@ -15914,8 +15890,8 @@
         </p:blipFill>
         <p:spPr>
           <a:xfrm>
-            <a:off x="3352800" y="2743200"/>
-            <a:ext cx="5486400" cy="3657600"/>
+            <a:off x="6858000" y="4023360"/>
+            <a:ext cx="2743200" cy="1828800"/>
           </a:xfrm>
           <a:prstGeom prst="rect">
             <a:avLst/>
@@ -15956,7 +15932,7 @@
           <a:lstStyle/>
           <a:p>
             <a:r>
-              <a:t>Tipos de computadoras</a:t>
+              <a:t>Tipos de Videojuegos</a:t>
             </a:r>
           </a:p>
         </p:txBody>
@@ -15975,33 +15951,9 @@
         <p:txBody>
           <a:bodyPr/>
           <a:lstStyle/>
-          <a:p/>
-        </p:txBody>
-      </p:sp>
-      <p:sp>
-        <p:nvSpPr>
-          <p:cNvPr id="4" name="TextBox 3"/>
-          <p:cNvSpPr txBox="1"/>
-          <p:nvPr/>
-        </p:nvSpPr>
-        <p:spPr>
-          <a:xfrm>
-            <a:off x="914400" y="1371600"/>
-            <a:ext cx="7315200" cy="4572000"/>
-          </a:xfrm>
-          <a:prstGeom prst="rect">
-            <a:avLst/>
-          </a:prstGeom>
-          <a:noFill/>
-        </p:spPr>
-        <p:txBody>
-          <a:bodyPr wrap="square">
-            <a:spAutoFit/>
-          </a:bodyPr>
-          <a:lstStyle/>
           <a:p>
             <a:r>
-              <a:t>Existen diferentes tipos de computadoras, desde computadoras de escritorio a computadoras portátiles.</a:t>
+              <a:t>Existen diferentes géneros de videojuegos, desde aventuras gráficas hasta juegos de acción y de lucha.</a:t>
             </a:r>
           </a:p>
         </p:txBody>
@@ -16040,7 +15992,7 @@
           <a:lstStyle/>
           <a:p>
             <a:r>
-              <a:t>Hardware y software de computadoras</a:t>
+              <a:t>Consolas de Videojuegos</a:t>
             </a:r>
           </a:p>
         </p:txBody>
@@ -16059,40 +16011,16 @@
         <p:txBody>
           <a:bodyPr/>
           <a:lstStyle/>
-          <a:p/>
-        </p:txBody>
-      </p:sp>
-      <p:sp>
-        <p:nvSpPr>
-          <p:cNvPr id="4" name="TextBox 3"/>
-          <p:cNvSpPr txBox="1"/>
-          <p:nvPr/>
-        </p:nvSpPr>
-        <p:spPr>
-          <a:xfrm>
-            <a:off x="914400" y="1371600"/>
-            <a:ext cx="7315200" cy="4572000"/>
-          </a:xfrm>
-          <a:prstGeom prst="rect">
-            <a:avLst/>
-          </a:prstGeom>
-          <a:noFill/>
-        </p:spPr>
-        <p:txBody>
-          <a:bodyPr wrap="square">
-            <a:spAutoFit/>
-          </a:bodyPr>
-          <a:lstStyle/>
           <a:p>
             <a:r>
-              <a:t>Los componentes hardware y software son los principales elementos que componen a una computadora.</a:t>
+              <a:t>Las consolas de videojuegos son dispositivos electrónicos diseñados para jugar videojuegos.</a:t>
             </a:r>
           </a:p>
         </p:txBody>
       </p:sp>
       <p:pic>
         <p:nvPicPr>
-          <p:cNvPr id="5" name="Picture 4" descr="temp.jpg"/>
+          <p:cNvPr id="4" name="Picture 3" descr="temp.jpg"/>
           <p:cNvPicPr>
             <a:picLocks noChangeAspect="1"/>
           </p:cNvPicPr>
@@ -16106,8 +16034,8 @@
         </p:blipFill>
         <p:spPr>
           <a:xfrm>
-            <a:off x="3352800" y="2743200"/>
-            <a:ext cx="5486400" cy="3657600"/>
+            <a:off x="6858000" y="4023360"/>
+            <a:ext cx="2743200" cy="1828800"/>
           </a:xfrm>
           <a:prstGeom prst="rect">
             <a:avLst/>
@@ -16148,7 +16076,7 @@
           <a:lstStyle/>
           <a:p>
             <a:r>
-              <a:t>Redes de computadoras</a:t>
+              <a:t>Jugadores de Videojuegos</a:t>
             </a:r>
           </a:p>
         </p:txBody>
@@ -16167,40 +16095,16 @@
         <p:txBody>
           <a:bodyPr/>
           <a:lstStyle/>
-          <a:p/>
-        </p:txBody>
-      </p:sp>
-      <p:sp>
-        <p:nvSpPr>
-          <p:cNvPr id="4" name="TextBox 3"/>
-          <p:cNvSpPr txBox="1"/>
-          <p:nvPr/>
-        </p:nvSpPr>
-        <p:spPr>
-          <a:xfrm>
-            <a:off x="914400" y="1371600"/>
-            <a:ext cx="7315200" cy="4572000"/>
-          </a:xfrm>
-          <a:prstGeom prst="rect">
-            <a:avLst/>
-          </a:prstGeom>
-          <a:noFill/>
-        </p:spPr>
-        <p:txBody>
-          <a:bodyPr wrap="square">
-            <a:spAutoFit/>
-          </a:bodyPr>
-          <a:lstStyle/>
           <a:p>
             <a:r>
-              <a:t>Las redes de computadoras permiten el intercambio de datos entre dispositivos conectados.</a:t>
+              <a:t>Los jugadores de videojuegos son personas que disfrutan jugando a los videojuegos a nivel competitivo o recreativo.</a:t>
             </a:r>
           </a:p>
         </p:txBody>
       </p:sp>
       <p:pic>
         <p:nvPicPr>
-          <p:cNvPr id="5" name="Picture 4" descr="temp.jpg"/>
+          <p:cNvPr id="4" name="Picture 3" descr="temp.jpg"/>
           <p:cNvPicPr>
             <a:picLocks noChangeAspect="1"/>
           </p:cNvPicPr>
@@ -16214,8 +16118,8 @@
         </p:blipFill>
         <p:spPr>
           <a:xfrm>
-            <a:off x="3352800" y="2743200"/>
-            <a:ext cx="5486400" cy="3657600"/>
+            <a:off x="6858000" y="4023360"/>
+            <a:ext cx="2743200" cy="1828800"/>
           </a:xfrm>
           <a:prstGeom prst="rect">
             <a:avLst/>
@@ -16256,7 +16160,7 @@
           <a:lstStyle/>
           <a:p>
             <a:r>
-              <a:t>Uso de computadoras en la vida cotidiana</a:t>
+              <a:t>Tendencias en Videojuegos</a:t>
             </a:r>
           </a:p>
         </p:txBody>
@@ -16275,37 +16179,37 @@
         <p:txBody>
           <a:bodyPr/>
           <a:lstStyle/>
-          <a:p/>
+          <a:p>
+            <a:r>
+              <a:t>Las tendencias en los videojuegos cambian con el tiempo, desde el uso de gráficos de última generación hasta el lanzamiento de nuevas consolas.</a:t>
+            </a:r>
+          </a:p>
         </p:txBody>
       </p:sp>
-      <p:sp>
-        <p:nvSpPr>
-          <p:cNvPr id="4" name="TextBox 3"/>
-          <p:cNvSpPr txBox="1"/>
+      <p:pic>
+        <p:nvPicPr>
+          <p:cNvPr id="4" name="Picture 3" descr="temp.jpg"/>
+          <p:cNvPicPr>
+            <a:picLocks noChangeAspect="1"/>
+          </p:cNvPicPr>
           <p:nvPr/>
-        </p:nvSpPr>
+        </p:nvPicPr>
+        <p:blipFill>
+          <a:blip r:embed="rId2"/>
+          <a:stretch>
+            <a:fillRect/>
+          </a:stretch>
+        </p:blipFill>
         <p:spPr>
           <a:xfrm>
-            <a:off x="914400" y="1371600"/>
-            <a:ext cx="7315200" cy="4572000"/>
+            <a:off x="6858000" y="4023360"/>
+            <a:ext cx="2743200" cy="1828800"/>
           </a:xfrm>
           <a:prstGeom prst="rect">
             <a:avLst/>
           </a:prstGeom>
-          <a:noFill/>
         </p:spPr>
-        <p:txBody>
-          <a:bodyPr wrap="square">
-            <a:spAutoFit/>
-          </a:bodyPr>
-          <a:lstStyle/>
-          <a:p>
-            <a:r>
-              <a:t>Las computadoras se utilizan en la vida cotidiana para realizar tareas como el procesamiento de datos, el envío de correos electrónicos y el acceso a la web.</a:t>
-            </a:r>
-          </a:p>
-        </p:txBody>
-      </p:sp>
+      </p:pic>
     </p:spTree>
   </p:cSld>
   <p:clrMapOvr>

</xml_diff>

<commit_message>
Opcion para establecer cantIdad de diapositivas
</commit_message>
<xml_diff>
--- a/app/temp/output.pptx
+++ b/app/temp/output.pptx
@@ -11,6 +11,11 @@
     <p:sldId id="259" r:id="rId9"/>
     <p:sldId id="260" r:id="rId10"/>
     <p:sldId id="261" r:id="rId11"/>
+    <p:sldId id="262" r:id="rId12"/>
+    <p:sldId id="263" r:id="rId13"/>
+    <p:sldId id="264" r:id="rId14"/>
+    <p:sldId id="265" r:id="rId15"/>
+    <p:sldId id="266" r:id="rId16"/>
   </p:sldIdLst>
   <p:sldSz cx="12192000" cy="6858000"/>
   <p:notesSz cx="6858000" cy="9144000"/>
@@ -15822,6 +15827,150 @@
 </p:sld>
 </file>
 
+<file path=ppt/slides/slide10.xml><?xml version="1.0" encoding="utf-8"?>
+<p:sld xmlns:a="http://schemas.openxmlformats.org/drawingml/2006/main" xmlns:p="http://schemas.openxmlformats.org/presentationml/2006/main" xmlns:r="http://schemas.openxmlformats.org/officeDocument/2006/relationships">
+  <p:cSld>
+    <p:spTree>
+      <p:nvGrpSpPr>
+        <p:cNvPr id="1" name=""/>
+        <p:cNvGrpSpPr/>
+        <p:nvPr/>
+      </p:nvGrpSpPr>
+      <p:grpSpPr/>
+      <p:sp>
+        <p:nvSpPr>
+          <p:cNvPr id="2" name="Title 1"/>
+          <p:cNvSpPr>
+            <a:spLocks noGrp="1"/>
+          </p:cNvSpPr>
+          <p:nvPr>
+            <p:ph type="title"/>
+          </p:nvPr>
+        </p:nvSpPr>
+        <p:spPr/>
+        <p:txBody>
+          <a:bodyPr/>
+          <a:lstStyle/>
+          <a:p>
+            <a:r>
+              <a:t>Importancia de la conservación del venado</a:t>
+            </a:r>
+          </a:p>
+        </p:txBody>
+      </p:sp>
+      <p:sp>
+        <p:nvSpPr>
+          <p:cNvPr id="3" name="Content Placeholder 2"/>
+          <p:cNvSpPr>
+            <a:spLocks noGrp="1"/>
+          </p:cNvSpPr>
+          <p:nvPr>
+            <p:ph idx="1"/>
+          </p:nvPr>
+        </p:nvSpPr>
+        <p:spPr/>
+        <p:txBody>
+          <a:bodyPr/>
+          <a:lstStyle/>
+          <a:p>
+            <a:r>
+              <a:t>La conservación de los venados es crucial para preservar la biodiversidad y el equilibrio de los ecosistemas.</a:t>
+            </a:r>
+          </a:p>
+        </p:txBody>
+      </p:sp>
+    </p:spTree>
+  </p:cSld>
+  <p:clrMapOvr>
+    <a:masterClrMapping/>
+  </p:clrMapOvr>
+</p:sld>
+</file>
+
+<file path=ppt/slides/slide11.xml><?xml version="1.0" encoding="utf-8"?>
+<p:sld xmlns:a="http://schemas.openxmlformats.org/drawingml/2006/main" xmlns:p="http://schemas.openxmlformats.org/presentationml/2006/main" xmlns:r="http://schemas.openxmlformats.org/officeDocument/2006/relationships">
+  <p:cSld>
+    <p:spTree>
+      <p:nvGrpSpPr>
+        <p:cNvPr id="1" name=""/>
+        <p:cNvGrpSpPr/>
+        <p:nvPr/>
+      </p:nvGrpSpPr>
+      <p:grpSpPr/>
+      <p:sp>
+        <p:nvSpPr>
+          <p:cNvPr id="2" name="Title 1"/>
+          <p:cNvSpPr>
+            <a:spLocks noGrp="1"/>
+          </p:cNvSpPr>
+          <p:nvPr>
+            <p:ph type="title"/>
+          </p:nvPr>
+        </p:nvSpPr>
+        <p:spPr/>
+        <p:txBody>
+          <a:bodyPr/>
+          <a:lstStyle/>
+          <a:p>
+            <a:r>
+              <a:t>Venados en la actualidad</a:t>
+            </a:r>
+          </a:p>
+        </p:txBody>
+      </p:sp>
+      <p:sp>
+        <p:nvSpPr>
+          <p:cNvPr id="3" name="Content Placeholder 2"/>
+          <p:cNvSpPr>
+            <a:spLocks noGrp="1"/>
+          </p:cNvSpPr>
+          <p:nvPr>
+            <p:ph idx="1"/>
+          </p:nvPr>
+        </p:nvSpPr>
+        <p:spPr/>
+        <p:txBody>
+          <a:bodyPr/>
+          <a:lstStyle/>
+          <a:p>
+            <a:r>
+              <a:t>Los venados son animales comunes en muchas partes del mundo hoy en día.</a:t>
+            </a:r>
+          </a:p>
+        </p:txBody>
+      </p:sp>
+      <p:pic>
+        <p:nvPicPr>
+          <p:cNvPr id="4" name="Picture 3" descr="temp.jpg"/>
+          <p:cNvPicPr>
+            <a:picLocks noChangeAspect="1"/>
+          </p:cNvPicPr>
+          <p:nvPr/>
+        </p:nvPicPr>
+        <p:blipFill>
+          <a:blip r:embed="rId2"/>
+          <a:stretch>
+            <a:fillRect/>
+          </a:stretch>
+        </p:blipFill>
+        <p:spPr>
+          <a:xfrm>
+            <a:off x="6583680" y="4023360"/>
+            <a:ext cx="2743200" cy="1828800"/>
+          </a:xfrm>
+          <a:prstGeom prst="rect">
+            <a:avLst/>
+          </a:prstGeom>
+        </p:spPr>
+      </p:pic>
+    </p:spTree>
+  </p:cSld>
+  <p:clrMapOvr>
+    <a:masterClrMapping/>
+  </p:clrMapOvr>
+</p:sld>
+</file>
+
 <file path=ppt/slides/slide2.xml><?xml version="1.0" encoding="utf-8"?>
 <p:sld xmlns:a="http://schemas.openxmlformats.org/drawingml/2006/main" xmlns:p="http://schemas.openxmlformats.org/presentationml/2006/main" xmlns:r="http://schemas.openxmlformats.org/officeDocument/2006/relationships">
   <p:cSld>
@@ -15848,7 +15997,7 @@
           <a:lstStyle/>
           <a:p>
             <a:r>
-              <a:t>Definición de Videojuegos</a:t>
+              <a:t>¿Qué es un venado?</a:t>
             </a:r>
           </a:p>
         </p:txBody>
@@ -15869,7 +16018,7 @@
           <a:lstStyle/>
           <a:p>
             <a:r>
-              <a:t>Los videojuegos son una forma de entretenimiento interactivo que involucra el uso de imágenes generadas por computadora y un controlador de algún tipo.</a:t>
+              <a:t>El venado es un mamífero artiodáctilo de la familia Cervidae.</a:t>
             </a:r>
           </a:p>
         </p:txBody>
@@ -15890,7 +16039,7 @@
         </p:blipFill>
         <p:spPr>
           <a:xfrm>
-            <a:off x="6858000" y="4023360"/>
+            <a:off x="6583680" y="4023360"/>
             <a:ext cx="2743200" cy="1828800"/>
           </a:xfrm>
           <a:prstGeom prst="rect">
@@ -15932,7 +16081,7 @@
           <a:lstStyle/>
           <a:p>
             <a:r>
-              <a:t>Tipos de Videojuegos</a:t>
+              <a:t>Características del venado</a:t>
             </a:r>
           </a:p>
         </p:txBody>
@@ -15953,7 +16102,7 @@
           <a:lstStyle/>
           <a:p>
             <a:r>
-              <a:t>Existen diferentes géneros de videojuegos, desde aventuras gráficas hasta juegos de acción y de lucha.</a:t>
+              <a:t>Existen diferentes especies de venados, cada una con características únicas.</a:t>
             </a:r>
           </a:p>
         </p:txBody>
@@ -15992,7 +16141,7 @@
           <a:lstStyle/>
           <a:p>
             <a:r>
-              <a:t>Consolas de Videojuegos</a:t>
+              <a:t>Cuernos ramificados del venado</a:t>
             </a:r>
           </a:p>
         </p:txBody>
@@ -16013,7 +16162,7 @@
           <a:lstStyle/>
           <a:p>
             <a:r>
-              <a:t>Las consolas de videojuegos son dispositivos electrónicos diseñados para jugar videojuegos.</a:t>
+              <a:t>Los venados poseen cuernos ramificados que son utilizados para la competencia y atracción de parejas.</a:t>
             </a:r>
           </a:p>
         </p:txBody>
@@ -16034,7 +16183,7 @@
         </p:blipFill>
         <p:spPr>
           <a:xfrm>
-            <a:off x="6858000" y="4023360"/>
+            <a:off x="6583680" y="4023360"/>
             <a:ext cx="2743200" cy="1828800"/>
           </a:xfrm>
           <a:prstGeom prst="rect">
@@ -16076,7 +16225,7 @@
           <a:lstStyle/>
           <a:p>
             <a:r>
-              <a:t>Jugadores de Videojuegos</a:t>
+              <a:t>Hábitats del venado</a:t>
             </a:r>
           </a:p>
         </p:txBody>
@@ -16097,7 +16246,7 @@
           <a:lstStyle/>
           <a:p>
             <a:r>
-              <a:t>Los jugadores de videojuegos son personas que disfrutan jugando a los videojuegos a nivel competitivo o recreativo.</a:t>
+              <a:t>Los venados se adaptan a diferentes hábitats, desde bosques hasta praderas y montañas.</a:t>
             </a:r>
           </a:p>
         </p:txBody>
@@ -16118,7 +16267,7 @@
         </p:blipFill>
         <p:spPr>
           <a:xfrm>
-            <a:off x="6858000" y="4023360"/>
+            <a:off x="6583680" y="4023360"/>
             <a:ext cx="2743200" cy="1828800"/>
           </a:xfrm>
           <a:prstGeom prst="rect">
@@ -16160,7 +16309,7 @@
           <a:lstStyle/>
           <a:p>
             <a:r>
-              <a:t>Tendencias en Videojuegos</a:t>
+              <a:t>Alimentación del venado</a:t>
             </a:r>
           </a:p>
         </p:txBody>
@@ -16181,7 +16330,7 @@
           <a:lstStyle/>
           <a:p>
             <a:r>
-              <a:t>Las tendencias en los videojuegos cambian con el tiempo, desde el uso de gráficos de última generación hasta el lanzamiento de nuevas consolas.</a:t>
+              <a:t>Los venados son herbívoros que se alimentan de plantas, frutos y brotes.</a:t>
             </a:r>
           </a:p>
         </p:txBody>
@@ -16202,7 +16351,7 @@
         </p:blipFill>
         <p:spPr>
           <a:xfrm>
-            <a:off x="6858000" y="4023360"/>
+            <a:off x="6583680" y="4023360"/>
             <a:ext cx="2743200" cy="1828800"/>
           </a:xfrm>
           <a:prstGeom prst="rect">
@@ -16210,6 +16359,210 @@
           </a:prstGeom>
         </p:spPr>
       </p:pic>
+    </p:spTree>
+  </p:cSld>
+  <p:clrMapOvr>
+    <a:masterClrMapping/>
+  </p:clrMapOvr>
+</p:sld>
+</file>
+
+<file path=ppt/slides/slide7.xml><?xml version="1.0" encoding="utf-8"?>
+<p:sld xmlns:a="http://schemas.openxmlformats.org/drawingml/2006/main" xmlns:p="http://schemas.openxmlformats.org/presentationml/2006/main" xmlns:r="http://schemas.openxmlformats.org/officeDocument/2006/relationships">
+  <p:cSld>
+    <p:spTree>
+      <p:nvGrpSpPr>
+        <p:cNvPr id="1" name=""/>
+        <p:cNvGrpSpPr/>
+        <p:nvPr/>
+      </p:nvGrpSpPr>
+      <p:grpSpPr/>
+      <p:sp>
+        <p:nvSpPr>
+          <p:cNvPr id="2" name="Title 1"/>
+          <p:cNvSpPr>
+            <a:spLocks noGrp="1"/>
+          </p:cNvSpPr>
+          <p:nvPr>
+            <p:ph type="title"/>
+          </p:nvPr>
+        </p:nvSpPr>
+        <p:spPr/>
+        <p:txBody>
+          <a:bodyPr/>
+          <a:lstStyle/>
+          <a:p>
+            <a:r>
+              <a:t>Reproducción del venado</a:t>
+            </a:r>
+          </a:p>
+        </p:txBody>
+      </p:sp>
+      <p:sp>
+        <p:nvSpPr>
+          <p:cNvPr id="3" name="Content Placeholder 2"/>
+          <p:cNvSpPr>
+            <a:spLocks noGrp="1"/>
+          </p:cNvSpPr>
+          <p:nvPr>
+            <p:ph idx="1"/>
+          </p:nvPr>
+        </p:nvSpPr>
+        <p:spPr/>
+        <p:txBody>
+          <a:bodyPr/>
+          <a:lstStyle/>
+          <a:p>
+            <a:r>
+              <a:t>Los venados tienen una temporada de apareamiento en la que los machos compiten por las hembras.</a:t>
+            </a:r>
+          </a:p>
+        </p:txBody>
+      </p:sp>
+    </p:spTree>
+  </p:cSld>
+  <p:clrMapOvr>
+    <a:masterClrMapping/>
+  </p:clrMapOvr>
+</p:sld>
+</file>
+
+<file path=ppt/slides/slide8.xml><?xml version="1.0" encoding="utf-8"?>
+<p:sld xmlns:a="http://schemas.openxmlformats.org/drawingml/2006/main" xmlns:p="http://schemas.openxmlformats.org/presentationml/2006/main" xmlns:r="http://schemas.openxmlformats.org/officeDocument/2006/relationships">
+  <p:cSld>
+    <p:spTree>
+      <p:nvGrpSpPr>
+        <p:cNvPr id="1" name=""/>
+        <p:cNvGrpSpPr/>
+        <p:nvPr/>
+      </p:nvGrpSpPr>
+      <p:grpSpPr/>
+      <p:sp>
+        <p:nvSpPr>
+          <p:cNvPr id="2" name="Title 1"/>
+          <p:cNvSpPr>
+            <a:spLocks noGrp="1"/>
+          </p:cNvSpPr>
+          <p:nvPr>
+            <p:ph type="title"/>
+          </p:nvPr>
+        </p:nvSpPr>
+        <p:spPr/>
+        <p:txBody>
+          <a:bodyPr/>
+          <a:lstStyle/>
+          <a:p>
+            <a:r>
+              <a:t>Caza del venado</a:t>
+            </a:r>
+          </a:p>
+        </p:txBody>
+      </p:sp>
+      <p:sp>
+        <p:nvSpPr>
+          <p:cNvPr id="3" name="Content Placeholder 2"/>
+          <p:cNvSpPr>
+            <a:spLocks noGrp="1"/>
+          </p:cNvSpPr>
+          <p:nvPr>
+            <p:ph idx="1"/>
+          </p:nvPr>
+        </p:nvSpPr>
+        <p:spPr/>
+        <p:txBody>
+          <a:bodyPr/>
+          <a:lstStyle/>
+          <a:p>
+            <a:r>
+              <a:t>La caza del venado es una actividad tradicional en algunas regiones.</a:t>
+            </a:r>
+          </a:p>
+        </p:txBody>
+      </p:sp>
+      <p:pic>
+        <p:nvPicPr>
+          <p:cNvPr id="4" name="Picture 3" descr="temp.jpg"/>
+          <p:cNvPicPr>
+            <a:picLocks noChangeAspect="1"/>
+          </p:cNvPicPr>
+          <p:nvPr/>
+        </p:nvPicPr>
+        <p:blipFill>
+          <a:blip r:embed="rId2"/>
+          <a:stretch>
+            <a:fillRect/>
+          </a:stretch>
+        </p:blipFill>
+        <p:spPr>
+          <a:xfrm>
+            <a:off x="6583680" y="4023360"/>
+            <a:ext cx="2743200" cy="1828800"/>
+          </a:xfrm>
+          <a:prstGeom prst="rect">
+            <a:avLst/>
+          </a:prstGeom>
+        </p:spPr>
+      </p:pic>
+    </p:spTree>
+  </p:cSld>
+  <p:clrMapOvr>
+    <a:masterClrMapping/>
+  </p:clrMapOvr>
+</p:sld>
+</file>
+
+<file path=ppt/slides/slide9.xml><?xml version="1.0" encoding="utf-8"?>
+<p:sld xmlns:a="http://schemas.openxmlformats.org/drawingml/2006/main" xmlns:p="http://schemas.openxmlformats.org/presentationml/2006/main" xmlns:r="http://schemas.openxmlformats.org/officeDocument/2006/relationships">
+  <p:cSld>
+    <p:spTree>
+      <p:nvGrpSpPr>
+        <p:cNvPr id="1" name=""/>
+        <p:cNvGrpSpPr/>
+        <p:nvPr/>
+      </p:nvGrpSpPr>
+      <p:grpSpPr/>
+      <p:sp>
+        <p:nvSpPr>
+          <p:cNvPr id="2" name="Title 1"/>
+          <p:cNvSpPr>
+            <a:spLocks noGrp="1"/>
+          </p:cNvSpPr>
+          <p:nvPr>
+            <p:ph type="title"/>
+          </p:nvPr>
+        </p:nvSpPr>
+        <p:spPr/>
+        <p:txBody>
+          <a:bodyPr/>
+          <a:lstStyle/>
+          <a:p>
+            <a:r>
+              <a:t>Venados en el folklore</a:t>
+            </a:r>
+          </a:p>
+        </p:txBody>
+      </p:sp>
+      <p:sp>
+        <p:nvSpPr>
+          <p:cNvPr id="3" name="Content Placeholder 2"/>
+          <p:cNvSpPr>
+            <a:spLocks noGrp="1"/>
+          </p:cNvSpPr>
+          <p:nvPr>
+            <p:ph idx="1"/>
+          </p:nvPr>
+        </p:nvSpPr>
+        <p:spPr/>
+        <p:txBody>
+          <a:bodyPr/>
+          <a:lstStyle/>
+          <a:p>
+            <a:r>
+              <a:t>Los venados han sido parte de la mitología y el folklore desde hace mucho tiempo.</a:t>
+            </a:r>
+          </a:p>
+        </p:txBody>
+      </p:sp>
     </p:spTree>
   </p:cSld>
   <p:clrMapOvr>

</xml_diff>

<commit_message>
Configurado para ser contenerizado en docker
</commit_message>
<xml_diff>
--- a/app/temp/output.pptx
+++ b/app/temp/output.pptx
@@ -12,8 +12,6 @@
     <p:sldId id="260" r:id="rId10"/>
     <p:sldId id="261" r:id="rId11"/>
     <p:sldId id="262" r:id="rId12"/>
-    <p:sldId id="263" r:id="rId13"/>
-    <p:sldId id="264" r:id="rId14"/>
   </p:sldIdLst>
   <p:sldSz cx="12192000" cy="6858000"/>
   <p:notesSz cx="6858000" cy="9144000"/>
@@ -15851,7 +15849,7 @@
           <a:lstStyle/>
           <a:p>
             <a:r>
-              <a:t>Definición de Agujero Negro</a:t>
+              <a:t>Definición de Mujeres</a:t>
             </a:r>
           </a:p>
         </p:txBody>
@@ -15872,7 +15870,7 @@
           <a:lstStyle/>
           <a:p>
             <a:r>
-              <a:t>Un agujero negro es una región del espacio-tiempo con una gravitación tan intensa que ninguna partícula o radiación puede escapar.</a:t>
+              <a:t>Las mujeres son seres humanos con diferentes características, capacidades y habilidades.</a:t>
             </a:r>
           </a:p>
         </p:txBody>
@@ -15935,7 +15933,7 @@
           <a:lstStyle/>
           <a:p>
             <a:r>
-              <a:t>Formación de Agujero Negro</a:t>
+              <a:t>Roles de las Mujeres</a:t>
             </a:r>
           </a:p>
         </p:txBody>
@@ -15956,7 +15954,7 @@
           <a:lstStyle/>
           <a:p>
             <a:r>
-              <a:t>Los agujeros negros se forman cuando una gran cantidad de masa se comprimen en un área muy pequeña.</a:t>
+              <a:t>Las mujeres desempeñan diferentes roles en la sociedad como líderes, trabajadoras, madres, amigas y más.</a:t>
             </a:r>
           </a:p>
         </p:txBody>
@@ -16019,7 +16017,7 @@
           <a:lstStyle/>
           <a:p>
             <a:r>
-              <a:t>Atributos de un Agujero Negro</a:t>
+              <a:t>Logros de las Mujeres</a:t>
             </a:r>
           </a:p>
         </p:txBody>
@@ -16040,11 +16038,35 @@
           <a:lstStyle/>
           <a:p>
             <a:r>
-              <a:t>Un agujero negro tiene una masa, un radio de Schwarzschild y una temperatura de Hawking.</a:t>
+              <a:t>Las mujeres han logrado grandes logros a lo largo de la historia en todos los campos de la vida.</a:t>
             </a:r>
           </a:p>
         </p:txBody>
       </p:sp>
+      <p:pic>
+        <p:nvPicPr>
+          <p:cNvPr id="4" name="Picture 3" descr="temp.jpg"/>
+          <p:cNvPicPr>
+            <a:picLocks noChangeAspect="1"/>
+          </p:cNvPicPr>
+          <p:nvPr/>
+        </p:nvPicPr>
+        <p:blipFill>
+          <a:blip r:embed="rId2"/>
+          <a:stretch>
+            <a:fillRect/>
+          </a:stretch>
+        </p:blipFill>
+        <p:spPr>
+          <a:xfrm>
+            <a:off x="6583680" y="4023360"/>
+            <a:ext cx="2743200" cy="1828800"/>
+          </a:xfrm>
+          <a:prstGeom prst="rect">
+            <a:avLst/>
+          </a:prstGeom>
+        </p:spPr>
+      </p:pic>
     </p:spTree>
   </p:cSld>
   <p:clrMapOvr>
@@ -16079,7 +16101,7 @@
           <a:lstStyle/>
           <a:p>
             <a:r>
-              <a:t>Efecto Gravitacional de un Agujero Negro</a:t>
+              <a:t>Derechos de las Mujeres</a:t>
             </a:r>
           </a:p>
         </p:txBody>
@@ -16100,7 +16122,7 @@
           <a:lstStyle/>
           <a:p>
             <a:r>
-              <a:t>Los agujeros negros tienen una fuerza gravitacional tan intensa que pueden atraer objetos a grandes distancias.</a:t>
+              <a:t>Las mujeres tienen derecho a recibir igualdad de trato, respeto y oportunidades sin discriminación de género.</a:t>
             </a:r>
           </a:p>
         </p:txBody>
@@ -16163,7 +16185,7 @@
           <a:lstStyle/>
           <a:p>
             <a:r>
-              <a:t>Evidencia de Agujero Negro</a:t>
+              <a:t>Lucha por la Igualdad de Género</a:t>
             </a:r>
           </a:p>
         </p:txBody>
@@ -16184,7 +16206,7 @@
           <a:lstStyle/>
           <a:p>
             <a:r>
-              <a:t>Se ha encontrado evidencia de agujeros negros en las regiones centrales de galaxias y cúmulos de galaxias.</a:t>
+              <a:t>La lucha por la igualdad de género es una lucha por la justicia social que busca erradicar la desigualdad entre hombres y mujeres.</a:t>
             </a:r>
           </a:p>
         </p:txBody>
@@ -16247,7 +16269,7 @@
           <a:lstStyle/>
           <a:p>
             <a:r>
-              <a:t>Supermasas de Agujero Negro</a:t>
+              <a:t>Encuentro de Mujeres</a:t>
             </a:r>
           </a:p>
         </p:txBody>
@@ -16268,7 +16290,7 @@
           <a:lstStyle/>
           <a:p>
             <a:r>
-              <a:t>Los agujeros negros supermasivos son agujeros negros que tienen una masa de millones a billones de veces la masa de nuestro Sol.</a:t>
+              <a:t>Los encuentros de mujeres son eventos que reúnen a mujeres de todo el mundo para abordar temas de interés común.</a:t>
             </a:r>
           </a:p>
         </p:txBody>
@@ -16297,150 +16319,6 @@
           </a:prstGeom>
         </p:spPr>
       </p:pic>
-    </p:spTree>
-  </p:cSld>
-  <p:clrMapOvr>
-    <a:masterClrMapping/>
-  </p:clrMapOvr>
-</p:sld>
-</file>
-
-<file path=ppt/slides/slide8.xml><?xml version="1.0" encoding="utf-8"?>
-<p:sld xmlns:a="http://schemas.openxmlformats.org/drawingml/2006/main" xmlns:p="http://schemas.openxmlformats.org/presentationml/2006/main" xmlns:r="http://schemas.openxmlformats.org/officeDocument/2006/relationships">
-  <p:cSld>
-    <p:spTree>
-      <p:nvGrpSpPr>
-        <p:cNvPr id="1" name=""/>
-        <p:cNvGrpSpPr/>
-        <p:nvPr/>
-      </p:nvGrpSpPr>
-      <p:grpSpPr/>
-      <p:sp>
-        <p:nvSpPr>
-          <p:cNvPr id="2" name="Title 1"/>
-          <p:cNvSpPr>
-            <a:spLocks noGrp="1"/>
-          </p:cNvSpPr>
-          <p:nvPr>
-            <p:ph type="title"/>
-          </p:nvPr>
-        </p:nvSpPr>
-        <p:spPr/>
-        <p:txBody>
-          <a:bodyPr/>
-          <a:lstStyle/>
-          <a:p>
-            <a:r>
-              <a:t>Observación de Agujero Negro</a:t>
-            </a:r>
-          </a:p>
-        </p:txBody>
-      </p:sp>
-      <p:sp>
-        <p:nvSpPr>
-          <p:cNvPr id="3" name="Content Placeholder 2"/>
-          <p:cNvSpPr>
-            <a:spLocks noGrp="1"/>
-          </p:cNvSpPr>
-          <p:nvPr>
-            <p:ph idx="1"/>
-          </p:nvPr>
-        </p:nvSpPr>
-        <p:spPr/>
-        <p:txBody>
-          <a:bodyPr/>
-          <a:lstStyle/>
-          <a:p>
-            <a:r>
-              <a:t>Los agujeros negros son difíciles de observar directamente debido a su campo gravitacional extremo.</a:t>
-            </a:r>
-          </a:p>
-        </p:txBody>
-      </p:sp>
-      <p:pic>
-        <p:nvPicPr>
-          <p:cNvPr id="4" name="Picture 3" descr="temp.jpg"/>
-          <p:cNvPicPr>
-            <a:picLocks noChangeAspect="1"/>
-          </p:cNvPicPr>
-          <p:nvPr/>
-        </p:nvPicPr>
-        <p:blipFill>
-          <a:blip r:embed="rId2"/>
-          <a:stretch>
-            <a:fillRect/>
-          </a:stretch>
-        </p:blipFill>
-        <p:spPr>
-          <a:xfrm>
-            <a:off x="6583680" y="4023360"/>
-            <a:ext cx="2743200" cy="1828800"/>
-          </a:xfrm>
-          <a:prstGeom prst="rect">
-            <a:avLst/>
-          </a:prstGeom>
-        </p:spPr>
-      </p:pic>
-    </p:spTree>
-  </p:cSld>
-  <p:clrMapOvr>
-    <a:masterClrMapping/>
-  </p:clrMapOvr>
-</p:sld>
-</file>
-
-<file path=ppt/slides/slide9.xml><?xml version="1.0" encoding="utf-8"?>
-<p:sld xmlns:a="http://schemas.openxmlformats.org/drawingml/2006/main" xmlns:p="http://schemas.openxmlformats.org/presentationml/2006/main" xmlns:r="http://schemas.openxmlformats.org/officeDocument/2006/relationships">
-  <p:cSld>
-    <p:spTree>
-      <p:nvGrpSpPr>
-        <p:cNvPr id="1" name=""/>
-        <p:cNvGrpSpPr/>
-        <p:nvPr/>
-      </p:nvGrpSpPr>
-      <p:grpSpPr/>
-      <p:sp>
-        <p:nvSpPr>
-          <p:cNvPr id="2" name="Title 1"/>
-          <p:cNvSpPr>
-            <a:spLocks noGrp="1"/>
-          </p:cNvSpPr>
-          <p:nvPr>
-            <p:ph type="title"/>
-          </p:nvPr>
-        </p:nvSpPr>
-        <p:spPr/>
-        <p:txBody>
-          <a:bodyPr/>
-          <a:lstStyle/>
-          <a:p>
-            <a:r>
-              <a:t>Implicaciones de Agujero Negro</a:t>
-            </a:r>
-          </a:p>
-        </p:txBody>
-      </p:sp>
-      <p:sp>
-        <p:nvSpPr>
-          <p:cNvPr id="3" name="Content Placeholder 2"/>
-          <p:cNvSpPr>
-            <a:spLocks noGrp="1"/>
-          </p:cNvSpPr>
-          <p:nvPr>
-            <p:ph idx="1"/>
-          </p:nvPr>
-        </p:nvSpPr>
-        <p:spPr/>
-        <p:txBody>
-          <a:bodyPr/>
-          <a:lstStyle/>
-          <a:p>
-            <a:r>
-              <a:t>Los agujeros negros tienen implicaciones profundas para la astronomía, la física y la cosmología.</a:t>
-            </a:r>
-          </a:p>
-        </p:txBody>
-      </p:sp>
     </p:spTree>
   </p:cSld>
   <p:clrMapOvr>

</xml_diff>

<commit_message>
avisos en la interfaz grafica
</commit_message>
<xml_diff>
--- a/app/temp/output.pptx
+++ b/app/temp/output.pptx
@@ -12,6 +12,16 @@
     <p:sldId id="260" r:id="rId10"/>
     <p:sldId id="261" r:id="rId11"/>
     <p:sldId id="262" r:id="rId12"/>
+    <p:sldId id="263" r:id="rId13"/>
+    <p:sldId id="264" r:id="rId14"/>
+    <p:sldId id="265" r:id="rId15"/>
+    <p:sldId id="266" r:id="rId16"/>
+    <p:sldId id="267" r:id="rId17"/>
+    <p:sldId id="268" r:id="rId18"/>
+    <p:sldId id="269" r:id="rId19"/>
+    <p:sldId id="270" r:id="rId20"/>
+    <p:sldId id="271" r:id="rId21"/>
+    <p:sldId id="272" r:id="rId22"/>
   </p:sldIdLst>
   <p:sldSz cx="12192000" cy="6858000"/>
   <p:notesSz cx="6858000" cy="9144000"/>
@@ -15823,6 +15833,510 @@
 </p:sld>
 </file>
 
+<file path=ppt/slides/slide10.xml><?xml version="1.0" encoding="utf-8"?>
+<p:sld xmlns:a="http://schemas.openxmlformats.org/drawingml/2006/main" xmlns:p="http://schemas.openxmlformats.org/presentationml/2006/main" xmlns:r="http://schemas.openxmlformats.org/officeDocument/2006/relationships">
+  <p:cSld>
+    <p:spTree>
+      <p:nvGrpSpPr>
+        <p:cNvPr id="1" name=""/>
+        <p:cNvGrpSpPr/>
+        <p:nvPr/>
+      </p:nvGrpSpPr>
+      <p:grpSpPr/>
+      <p:sp>
+        <p:nvSpPr>
+          <p:cNvPr id="2" name="Title 1"/>
+          <p:cNvSpPr>
+            <a:spLocks noGrp="1"/>
+          </p:cNvSpPr>
+          <p:nvPr>
+            <p:ph type="title"/>
+          </p:nvPr>
+        </p:nvSpPr>
+        <p:spPr/>
+        <p:txBody>
+          <a:bodyPr/>
+          <a:lstStyle/>
+          <a:p>
+            <a:r>
+              <a:t>Tipos de datos en Python</a:t>
+            </a:r>
+          </a:p>
+        </p:txBody>
+      </p:sp>
+      <p:sp>
+        <p:nvSpPr>
+          <p:cNvPr id="3" name="Content Placeholder 2"/>
+          <p:cNvSpPr>
+            <a:spLocks noGrp="1"/>
+          </p:cNvSpPr>
+          <p:nvPr>
+            <p:ph idx="1"/>
+          </p:nvPr>
+        </p:nvSpPr>
+        <p:spPr/>
+        <p:txBody>
+          <a:bodyPr/>
+          <a:lstStyle/>
+          <a:p>
+            <a:r>
+              <a:t>Python ofrece diferentes tipos de datos, como enteros, cadenas, booleanos, secuencias, mapeos y conjuntos.</a:t>
+            </a:r>
+          </a:p>
+        </p:txBody>
+      </p:sp>
+    </p:spTree>
+  </p:cSld>
+  <p:clrMapOvr>
+    <a:masterClrMapping/>
+  </p:clrMapOvr>
+</p:sld>
+</file>
+
+<file path=ppt/slides/slide11.xml><?xml version="1.0" encoding="utf-8"?>
+<p:sld xmlns:a="http://schemas.openxmlformats.org/drawingml/2006/main" xmlns:p="http://schemas.openxmlformats.org/presentationml/2006/main" xmlns:r="http://schemas.openxmlformats.org/officeDocument/2006/relationships">
+  <p:cSld>
+    <p:spTree>
+      <p:nvGrpSpPr>
+        <p:cNvPr id="1" name=""/>
+        <p:cNvGrpSpPr/>
+        <p:nvPr/>
+      </p:nvGrpSpPr>
+      <p:grpSpPr/>
+      <p:sp>
+        <p:nvSpPr>
+          <p:cNvPr id="2" name="Title 1"/>
+          <p:cNvSpPr>
+            <a:spLocks noGrp="1"/>
+          </p:cNvSpPr>
+          <p:nvPr>
+            <p:ph type="title"/>
+          </p:nvPr>
+        </p:nvSpPr>
+        <p:spPr/>
+        <p:txBody>
+          <a:bodyPr/>
+          <a:lstStyle/>
+          <a:p>
+            <a:r>
+              <a:t>Estructuras de datos en Python</a:t>
+            </a:r>
+          </a:p>
+        </p:txBody>
+      </p:sp>
+      <p:sp>
+        <p:nvSpPr>
+          <p:cNvPr id="3" name="Content Placeholder 2"/>
+          <p:cNvSpPr>
+            <a:spLocks noGrp="1"/>
+          </p:cNvSpPr>
+          <p:nvPr>
+            <p:ph idx="1"/>
+          </p:nvPr>
+        </p:nvSpPr>
+        <p:spPr/>
+        <p:txBody>
+          <a:bodyPr/>
+          <a:lstStyle/>
+          <a:p>
+            <a:r>
+              <a:t>Las estructuras de datos en Python incluyen listas, tuplas, diccionarios, conjuntos y matrices.</a:t>
+            </a:r>
+          </a:p>
+        </p:txBody>
+      </p:sp>
+    </p:spTree>
+  </p:cSld>
+  <p:clrMapOvr>
+    <a:masterClrMapping/>
+  </p:clrMapOvr>
+</p:sld>
+</file>
+
+<file path=ppt/slides/slide12.xml><?xml version="1.0" encoding="utf-8"?>
+<p:sld xmlns:a="http://schemas.openxmlformats.org/drawingml/2006/main" xmlns:p="http://schemas.openxmlformats.org/presentationml/2006/main" xmlns:r="http://schemas.openxmlformats.org/officeDocument/2006/relationships">
+  <p:cSld>
+    <p:spTree>
+      <p:nvGrpSpPr>
+        <p:cNvPr id="1" name=""/>
+        <p:cNvGrpSpPr/>
+        <p:nvPr/>
+      </p:nvGrpSpPr>
+      <p:grpSpPr/>
+      <p:sp>
+        <p:nvSpPr>
+          <p:cNvPr id="2" name="Title 1"/>
+          <p:cNvSpPr>
+            <a:spLocks noGrp="1"/>
+          </p:cNvSpPr>
+          <p:nvPr>
+            <p:ph type="title"/>
+          </p:nvPr>
+        </p:nvSpPr>
+        <p:spPr/>
+        <p:txBody>
+          <a:bodyPr/>
+          <a:lstStyle/>
+          <a:p>
+            <a:r>
+              <a:t>Funciones en Python</a:t>
+            </a:r>
+          </a:p>
+        </p:txBody>
+      </p:sp>
+      <p:sp>
+        <p:nvSpPr>
+          <p:cNvPr id="3" name="Content Placeholder 2"/>
+          <p:cNvSpPr>
+            <a:spLocks noGrp="1"/>
+          </p:cNvSpPr>
+          <p:nvPr>
+            <p:ph idx="1"/>
+          </p:nvPr>
+        </p:nvSpPr>
+        <p:spPr/>
+        <p:txBody>
+          <a:bodyPr/>
+          <a:lstStyle/>
+          <a:p>
+            <a:r>
+              <a:t>Las funciones en Python pueden recibir argumentos y devolver valores, y se usan para realizar tareas específicas.</a:t>
+            </a:r>
+          </a:p>
+        </p:txBody>
+      </p:sp>
+      <p:pic>
+        <p:nvPicPr>
+          <p:cNvPr id="4" name="Picture 3" descr="temp.jpg"/>
+          <p:cNvPicPr>
+            <a:picLocks noChangeAspect="1"/>
+          </p:cNvPicPr>
+          <p:nvPr/>
+        </p:nvPicPr>
+        <p:blipFill>
+          <a:blip r:embed="rId2"/>
+          <a:stretch>
+            <a:fillRect/>
+          </a:stretch>
+        </p:blipFill>
+        <p:spPr>
+          <a:xfrm>
+            <a:off x="6583680" y="4023360"/>
+            <a:ext cx="2743200" cy="1828800"/>
+          </a:xfrm>
+          <a:prstGeom prst="rect">
+            <a:avLst/>
+          </a:prstGeom>
+        </p:spPr>
+      </p:pic>
+    </p:spTree>
+  </p:cSld>
+  <p:clrMapOvr>
+    <a:masterClrMapping/>
+  </p:clrMapOvr>
+</p:sld>
+</file>
+
+<file path=ppt/slides/slide13.xml><?xml version="1.0" encoding="utf-8"?>
+<p:sld xmlns:a="http://schemas.openxmlformats.org/drawingml/2006/main" xmlns:p="http://schemas.openxmlformats.org/presentationml/2006/main" xmlns:r="http://schemas.openxmlformats.org/officeDocument/2006/relationships">
+  <p:cSld>
+    <p:spTree>
+      <p:nvGrpSpPr>
+        <p:cNvPr id="1" name=""/>
+        <p:cNvGrpSpPr/>
+        <p:nvPr/>
+      </p:nvGrpSpPr>
+      <p:grpSpPr/>
+      <p:sp>
+        <p:nvSpPr>
+          <p:cNvPr id="2" name="Title 1"/>
+          <p:cNvSpPr>
+            <a:spLocks noGrp="1"/>
+          </p:cNvSpPr>
+          <p:nvPr>
+            <p:ph type="title"/>
+          </p:nvPr>
+        </p:nvSpPr>
+        <p:spPr/>
+        <p:txBody>
+          <a:bodyPr/>
+          <a:lstStyle/>
+          <a:p>
+            <a:r>
+              <a:t>Clases y objetos en Python</a:t>
+            </a:r>
+          </a:p>
+        </p:txBody>
+      </p:sp>
+      <p:sp>
+        <p:nvSpPr>
+          <p:cNvPr id="3" name="Content Placeholder 2"/>
+          <p:cNvSpPr>
+            <a:spLocks noGrp="1"/>
+          </p:cNvSpPr>
+          <p:nvPr>
+            <p:ph idx="1"/>
+          </p:nvPr>
+        </p:nvSpPr>
+        <p:spPr/>
+        <p:txBody>
+          <a:bodyPr/>
+          <a:lstStyle/>
+          <a:p>
+            <a:r>
+              <a:t>Python es un lenguaje orientado a objetos que permite definir clases y crear instancias de objetos para manipular los datos.</a:t>
+            </a:r>
+          </a:p>
+        </p:txBody>
+      </p:sp>
+    </p:spTree>
+  </p:cSld>
+  <p:clrMapOvr>
+    <a:masterClrMapping/>
+  </p:clrMapOvr>
+</p:sld>
+</file>
+
+<file path=ppt/slides/slide14.xml><?xml version="1.0" encoding="utf-8"?>
+<p:sld xmlns:a="http://schemas.openxmlformats.org/drawingml/2006/main" xmlns:p="http://schemas.openxmlformats.org/presentationml/2006/main" xmlns:r="http://schemas.openxmlformats.org/officeDocument/2006/relationships">
+  <p:cSld>
+    <p:spTree>
+      <p:nvGrpSpPr>
+        <p:cNvPr id="1" name=""/>
+        <p:cNvGrpSpPr/>
+        <p:nvPr/>
+      </p:nvGrpSpPr>
+      <p:grpSpPr/>
+      <p:sp>
+        <p:nvSpPr>
+          <p:cNvPr id="2" name="Title 1"/>
+          <p:cNvSpPr>
+            <a:spLocks noGrp="1"/>
+          </p:cNvSpPr>
+          <p:nvPr>
+            <p:ph type="title"/>
+          </p:nvPr>
+        </p:nvSpPr>
+        <p:spPr/>
+        <p:txBody>
+          <a:bodyPr/>
+          <a:lstStyle/>
+          <a:p>
+            <a:r>
+              <a:t>Módulos en Python</a:t>
+            </a:r>
+          </a:p>
+        </p:txBody>
+      </p:sp>
+      <p:sp>
+        <p:nvSpPr>
+          <p:cNvPr id="3" name="Content Placeholder 2"/>
+          <p:cNvSpPr>
+            <a:spLocks noGrp="1"/>
+          </p:cNvSpPr>
+          <p:nvPr>
+            <p:ph idx="1"/>
+          </p:nvPr>
+        </p:nvSpPr>
+        <p:spPr/>
+        <p:txBody>
+          <a:bodyPr/>
+          <a:lstStyle/>
+          <a:p>
+            <a:r>
+              <a:t>Python ofrece una amplia variedad de módulos para realizar tareas comunes sin necesidad de escribir código.</a:t>
+            </a:r>
+          </a:p>
+        </p:txBody>
+      </p:sp>
+    </p:spTree>
+  </p:cSld>
+  <p:clrMapOvr>
+    <a:masterClrMapping/>
+  </p:clrMapOvr>
+</p:sld>
+</file>
+
+<file path=ppt/slides/slide15.xml><?xml version="1.0" encoding="utf-8"?>
+<p:sld xmlns:a="http://schemas.openxmlformats.org/drawingml/2006/main" xmlns:p="http://schemas.openxmlformats.org/presentationml/2006/main" xmlns:r="http://schemas.openxmlformats.org/officeDocument/2006/relationships">
+  <p:cSld>
+    <p:spTree>
+      <p:nvGrpSpPr>
+        <p:cNvPr id="1" name=""/>
+        <p:cNvGrpSpPr/>
+        <p:nvPr/>
+      </p:nvGrpSpPr>
+      <p:grpSpPr/>
+      <p:sp>
+        <p:nvSpPr>
+          <p:cNvPr id="2" name="Title 1"/>
+          <p:cNvSpPr>
+            <a:spLocks noGrp="1"/>
+          </p:cNvSpPr>
+          <p:nvPr>
+            <p:ph type="title"/>
+          </p:nvPr>
+        </p:nvSpPr>
+        <p:spPr/>
+        <p:txBody>
+          <a:bodyPr/>
+          <a:lstStyle/>
+          <a:p>
+            <a:r>
+              <a:t>Paquetes de Python</a:t>
+            </a:r>
+          </a:p>
+        </p:txBody>
+      </p:sp>
+      <p:sp>
+        <p:nvSpPr>
+          <p:cNvPr id="3" name="Content Placeholder 2"/>
+          <p:cNvSpPr>
+            <a:spLocks noGrp="1"/>
+          </p:cNvSpPr>
+          <p:nvPr>
+            <p:ph idx="1"/>
+          </p:nvPr>
+        </p:nvSpPr>
+        <p:spPr/>
+        <p:txBody>
+          <a:bodyPr/>
+          <a:lstStyle/>
+          <a:p>
+            <a:r>
+              <a:t>Los paquetes de Python son colecciones de módulos que permiten organizar y reutilizar el código para una aplicación específica.</a:t>
+            </a:r>
+          </a:p>
+        </p:txBody>
+      </p:sp>
+    </p:spTree>
+  </p:cSld>
+  <p:clrMapOvr>
+    <a:masterClrMapping/>
+  </p:clrMapOvr>
+</p:sld>
+</file>
+
+<file path=ppt/slides/slide16.xml><?xml version="1.0" encoding="utf-8"?>
+<p:sld xmlns:a="http://schemas.openxmlformats.org/drawingml/2006/main" xmlns:p="http://schemas.openxmlformats.org/presentationml/2006/main" xmlns:r="http://schemas.openxmlformats.org/officeDocument/2006/relationships">
+  <p:cSld>
+    <p:spTree>
+      <p:nvGrpSpPr>
+        <p:cNvPr id="1" name=""/>
+        <p:cNvGrpSpPr/>
+        <p:nvPr/>
+      </p:nvGrpSpPr>
+      <p:grpSpPr/>
+      <p:sp>
+        <p:nvSpPr>
+          <p:cNvPr id="2" name="Title 1"/>
+          <p:cNvSpPr>
+            <a:spLocks noGrp="1"/>
+          </p:cNvSpPr>
+          <p:nvPr>
+            <p:ph type="title"/>
+          </p:nvPr>
+        </p:nvSpPr>
+        <p:spPr/>
+        <p:txBody>
+          <a:bodyPr/>
+          <a:lstStyle/>
+          <a:p>
+            <a:r>
+              <a:t>Herramientas de desarrollo de Python</a:t>
+            </a:r>
+          </a:p>
+        </p:txBody>
+      </p:sp>
+      <p:sp>
+        <p:nvSpPr>
+          <p:cNvPr id="3" name="Content Placeholder 2"/>
+          <p:cNvSpPr>
+            <a:spLocks noGrp="1"/>
+          </p:cNvSpPr>
+          <p:nvPr>
+            <p:ph idx="1"/>
+          </p:nvPr>
+        </p:nvSpPr>
+        <p:spPr/>
+        <p:txBody>
+          <a:bodyPr/>
+          <a:lstStyle/>
+          <a:p>
+            <a:r>
+              <a:t>Python ofrece herramientas de desarrollo específicas para ayudar a los desarrolladores a generar código de forma rápida y eficiente.</a:t>
+            </a:r>
+          </a:p>
+        </p:txBody>
+      </p:sp>
+    </p:spTree>
+  </p:cSld>
+  <p:clrMapOvr>
+    <a:masterClrMapping/>
+  </p:clrMapOvr>
+</p:sld>
+</file>
+
+<file path=ppt/slides/slide17.xml><?xml version="1.0" encoding="utf-8"?>
+<p:sld xmlns:a="http://schemas.openxmlformats.org/drawingml/2006/main" xmlns:p="http://schemas.openxmlformats.org/presentationml/2006/main" xmlns:r="http://schemas.openxmlformats.org/officeDocument/2006/relationships">
+  <p:cSld>
+    <p:spTree>
+      <p:nvGrpSpPr>
+        <p:cNvPr id="1" name=""/>
+        <p:cNvGrpSpPr/>
+        <p:nvPr/>
+      </p:nvGrpSpPr>
+      <p:grpSpPr/>
+      <p:sp>
+        <p:nvSpPr>
+          <p:cNvPr id="2" name="Title 1"/>
+          <p:cNvSpPr>
+            <a:spLocks noGrp="1"/>
+          </p:cNvSpPr>
+          <p:nvPr>
+            <p:ph type="title"/>
+          </p:nvPr>
+        </p:nvSpPr>
+        <p:spPr/>
+        <p:txBody>
+          <a:bodyPr/>
+          <a:lstStyle/>
+          <a:p>
+            <a:r>
+              <a:t>Documentación de Python</a:t>
+            </a:r>
+          </a:p>
+        </p:txBody>
+      </p:sp>
+      <p:sp>
+        <p:nvSpPr>
+          <p:cNvPr id="3" name="Content Placeholder 2"/>
+          <p:cNvSpPr>
+            <a:spLocks noGrp="1"/>
+          </p:cNvSpPr>
+          <p:nvPr>
+            <p:ph idx="1"/>
+          </p:nvPr>
+        </p:nvSpPr>
+        <p:spPr/>
+        <p:txBody>
+          <a:bodyPr/>
+          <a:lstStyle/>
+          <a:p>
+            <a:r>
+              <a:t>Python tiene una documentación extensa, clara y detallada para ayudar a los desarrolladores a entender y usar el lenguaje.</a:t>
+            </a:r>
+          </a:p>
+        </p:txBody>
+      </p:sp>
+    </p:spTree>
+  </p:cSld>
+  <p:clrMapOvr>
+    <a:masterClrMapping/>
+  </p:clrMapOvr>
+</p:sld>
+</file>
+
 <file path=ppt/slides/slide2.xml><?xml version="1.0" encoding="utf-8"?>
 <p:sld xmlns:a="http://schemas.openxmlformats.org/drawingml/2006/main" xmlns:p="http://schemas.openxmlformats.org/presentationml/2006/main" xmlns:r="http://schemas.openxmlformats.org/officeDocument/2006/relationships">
   <p:cSld>
@@ -15849,7 +16363,7 @@
           <a:lstStyle/>
           <a:p>
             <a:r>
-              <a:t>Definición de Mujeres</a:t>
+              <a:t>Definición de Python</a:t>
             </a:r>
           </a:p>
         </p:txBody>
@@ -15870,7 +16384,7 @@
           <a:lstStyle/>
           <a:p>
             <a:r>
-              <a:t>Las mujeres son seres humanos con diferentes características, capacidades y habilidades.</a:t>
+              <a:t>Python es un lenguaje de programación orientado a objetos y de alto nivel con sintaxis clara y concisa.</a:t>
             </a:r>
           </a:p>
         </p:txBody>
@@ -15933,7 +16447,7 @@
           <a:lstStyle/>
           <a:p>
             <a:r>
-              <a:t>Roles de las Mujeres</a:t>
+              <a:t>Ventajas de Python</a:t>
             </a:r>
           </a:p>
         </p:txBody>
@@ -15954,35 +16468,11 @@
           <a:lstStyle/>
           <a:p>
             <a:r>
-              <a:t>Las mujeres desempeñan diferentes roles en la sociedad como líderes, trabajadoras, madres, amigas y más.</a:t>
+              <a:t>Python ofrece numerosas ventajas, como la sencillez, la facilidad de aprendizaje, la robustez y la portabilidad.</a:t>
             </a:r>
           </a:p>
         </p:txBody>
       </p:sp>
-      <p:pic>
-        <p:nvPicPr>
-          <p:cNvPr id="4" name="Picture 3" descr="temp.jpg"/>
-          <p:cNvPicPr>
-            <a:picLocks noChangeAspect="1"/>
-          </p:cNvPicPr>
-          <p:nvPr/>
-        </p:nvPicPr>
-        <p:blipFill>
-          <a:blip r:embed="rId2"/>
-          <a:stretch>
-            <a:fillRect/>
-          </a:stretch>
-        </p:blipFill>
-        <p:spPr>
-          <a:xfrm>
-            <a:off x="6583680" y="4023360"/>
-            <a:ext cx="2743200" cy="1828800"/>
-          </a:xfrm>
-          <a:prstGeom prst="rect">
-            <a:avLst/>
-          </a:prstGeom>
-        </p:spPr>
-      </p:pic>
     </p:spTree>
   </p:cSld>
   <p:clrMapOvr>
@@ -16017,7 +16507,7 @@
           <a:lstStyle/>
           <a:p>
             <a:r>
-              <a:t>Logros de las Mujeres</a:t>
+              <a:t>Aplicaciones de Python</a:t>
             </a:r>
           </a:p>
         </p:txBody>
@@ -16038,7 +16528,7 @@
           <a:lstStyle/>
           <a:p>
             <a:r>
-              <a:t>Las mujeres han logrado grandes logros a lo largo de la historia en todos los campos de la vida.</a:t>
+              <a:t>Python se usa ampliamente en aplicaciones de desarrollo web, análisis de datos, ciencias de la computación y para el aprendizaje automático.</a:t>
             </a:r>
           </a:p>
         </p:txBody>
@@ -16101,7 +16591,7 @@
           <a:lstStyle/>
           <a:p>
             <a:r>
-              <a:t>Derechos de las Mujeres</a:t>
+              <a:t>Instalación de Python</a:t>
             </a:r>
           </a:p>
         </p:txBody>
@@ -16122,35 +16612,11 @@
           <a:lstStyle/>
           <a:p>
             <a:r>
-              <a:t>Las mujeres tienen derecho a recibir igualdad de trato, respeto y oportunidades sin discriminación de género.</a:t>
+              <a:t>Para instalar Python, descargue el paquete de instalación correspondiente a su sistema operativo y siga las instrucciones que se proporcionan.</a:t>
             </a:r>
           </a:p>
         </p:txBody>
       </p:sp>
-      <p:pic>
-        <p:nvPicPr>
-          <p:cNvPr id="4" name="Picture 3" descr="temp.jpg"/>
-          <p:cNvPicPr>
-            <a:picLocks noChangeAspect="1"/>
-          </p:cNvPicPr>
-          <p:nvPr/>
-        </p:nvPicPr>
-        <p:blipFill>
-          <a:blip r:embed="rId2"/>
-          <a:stretch>
-            <a:fillRect/>
-          </a:stretch>
-        </p:blipFill>
-        <p:spPr>
-          <a:xfrm>
-            <a:off x="6583680" y="4023360"/>
-            <a:ext cx="2743200" cy="1828800"/>
-          </a:xfrm>
-          <a:prstGeom prst="rect">
-            <a:avLst/>
-          </a:prstGeom>
-        </p:spPr>
-      </p:pic>
     </p:spTree>
   </p:cSld>
   <p:clrMapOvr>
@@ -16185,7 +16651,7 @@
           <a:lstStyle/>
           <a:p>
             <a:r>
-              <a:t>Lucha por la Igualdad de Género</a:t>
+              <a:t>Bibliotecas de Python</a:t>
             </a:r>
           </a:p>
         </p:txBody>
@@ -16206,35 +16672,11 @@
           <a:lstStyle/>
           <a:p>
             <a:r>
-              <a:t>La lucha por la igualdad de género es una lucha por la justicia social que busca erradicar la desigualdad entre hombres y mujeres.</a:t>
+              <a:t>Python ofrece una amplia gama de bibliotecas y módulos para facilitar el desarrollo de aplicaciones y programas.</a:t>
             </a:r>
           </a:p>
         </p:txBody>
       </p:sp>
-      <p:pic>
-        <p:nvPicPr>
-          <p:cNvPr id="4" name="Picture 3" descr="temp.jpg"/>
-          <p:cNvPicPr>
-            <a:picLocks noChangeAspect="1"/>
-          </p:cNvPicPr>
-          <p:nvPr/>
-        </p:nvPicPr>
-        <p:blipFill>
-          <a:blip r:embed="rId2"/>
-          <a:stretch>
-            <a:fillRect/>
-          </a:stretch>
-        </p:blipFill>
-        <p:spPr>
-          <a:xfrm>
-            <a:off x="6583680" y="4023360"/>
-            <a:ext cx="2743200" cy="1828800"/>
-          </a:xfrm>
-          <a:prstGeom prst="rect">
-            <a:avLst/>
-          </a:prstGeom>
-        </p:spPr>
-      </p:pic>
     </p:spTree>
   </p:cSld>
   <p:clrMapOvr>
@@ -16269,7 +16711,7 @@
           <a:lstStyle/>
           <a:p>
             <a:r>
-              <a:t>Encuentro de Mujeres</a:t>
+              <a:t>Herramientas de Python</a:t>
             </a:r>
           </a:p>
         </p:txBody>
@@ -16290,35 +16732,131 @@
           <a:lstStyle/>
           <a:p>
             <a:r>
-              <a:t>Los encuentros de mujeres son eventos que reúnen a mujeres de todo el mundo para abordar temas de interés común.</a:t>
+              <a:t>Python ofrece herramientas para los programadores como el intérprete de Python, el entorno de desarrollo integrado (IDE) y el editor de texto.</a:t>
             </a:r>
           </a:p>
         </p:txBody>
       </p:sp>
-      <p:pic>
-        <p:nvPicPr>
-          <p:cNvPr id="4" name="Picture 3" descr="temp.jpg"/>
-          <p:cNvPicPr>
-            <a:picLocks noChangeAspect="1"/>
-          </p:cNvPicPr>
-          <p:nvPr/>
-        </p:nvPicPr>
-        <p:blipFill>
-          <a:blip r:embed="rId2"/>
-          <a:stretch>
-            <a:fillRect/>
-          </a:stretch>
-        </p:blipFill>
-        <p:spPr>
-          <a:xfrm>
-            <a:off x="6583680" y="4023360"/>
-            <a:ext cx="2743200" cy="1828800"/>
-          </a:xfrm>
-          <a:prstGeom prst="rect">
-            <a:avLst/>
-          </a:prstGeom>
-        </p:spPr>
-      </p:pic>
+    </p:spTree>
+  </p:cSld>
+  <p:clrMapOvr>
+    <a:masterClrMapping/>
+  </p:clrMapOvr>
+</p:sld>
+</file>
+
+<file path=ppt/slides/slide8.xml><?xml version="1.0" encoding="utf-8"?>
+<p:sld xmlns:a="http://schemas.openxmlformats.org/drawingml/2006/main" xmlns:p="http://schemas.openxmlformats.org/presentationml/2006/main" xmlns:r="http://schemas.openxmlformats.org/officeDocument/2006/relationships">
+  <p:cSld>
+    <p:spTree>
+      <p:nvGrpSpPr>
+        <p:cNvPr id="1" name=""/>
+        <p:cNvGrpSpPr/>
+        <p:nvPr/>
+      </p:nvGrpSpPr>
+      <p:grpSpPr/>
+      <p:sp>
+        <p:nvSpPr>
+          <p:cNvPr id="2" name="Title 1"/>
+          <p:cNvSpPr>
+            <a:spLocks noGrp="1"/>
+          </p:cNvSpPr>
+          <p:nvPr>
+            <p:ph type="title"/>
+          </p:nvPr>
+        </p:nvSpPr>
+        <p:spPr/>
+        <p:txBody>
+          <a:bodyPr/>
+          <a:lstStyle/>
+          <a:p>
+            <a:r>
+              <a:t>Ventajas del lenguaje Python</a:t>
+            </a:r>
+          </a:p>
+        </p:txBody>
+      </p:sp>
+      <p:sp>
+        <p:nvSpPr>
+          <p:cNvPr id="3" name="Content Placeholder 2"/>
+          <p:cNvSpPr>
+            <a:spLocks noGrp="1"/>
+          </p:cNvSpPr>
+          <p:nvPr>
+            <p:ph idx="1"/>
+          </p:nvPr>
+        </p:nvSpPr>
+        <p:spPr/>
+        <p:txBody>
+          <a:bodyPr/>
+          <a:lstStyle/>
+          <a:p>
+            <a:r>
+              <a:t>Python es un lenguaje de programación de alto nivel, flexible, fácil de usar y de aprender, con una sintaxis intuitiva.</a:t>
+            </a:r>
+          </a:p>
+        </p:txBody>
+      </p:sp>
+    </p:spTree>
+  </p:cSld>
+  <p:clrMapOvr>
+    <a:masterClrMapping/>
+  </p:clrMapOvr>
+</p:sld>
+</file>
+
+<file path=ppt/slides/slide9.xml><?xml version="1.0" encoding="utf-8"?>
+<p:sld xmlns:a="http://schemas.openxmlformats.org/drawingml/2006/main" xmlns:p="http://schemas.openxmlformats.org/presentationml/2006/main" xmlns:r="http://schemas.openxmlformats.org/officeDocument/2006/relationships">
+  <p:cSld>
+    <p:spTree>
+      <p:nvGrpSpPr>
+        <p:cNvPr id="1" name=""/>
+        <p:cNvGrpSpPr/>
+        <p:nvPr/>
+      </p:nvGrpSpPr>
+      <p:grpSpPr/>
+      <p:sp>
+        <p:nvSpPr>
+          <p:cNvPr id="2" name="Title 1"/>
+          <p:cNvSpPr>
+            <a:spLocks noGrp="1"/>
+          </p:cNvSpPr>
+          <p:nvPr>
+            <p:ph type="title"/>
+          </p:nvPr>
+        </p:nvSpPr>
+        <p:spPr/>
+        <p:txBody>
+          <a:bodyPr/>
+          <a:lstStyle/>
+          <a:p>
+            <a:r>
+              <a:t>Desventajas del lenguaje Python</a:t>
+            </a:r>
+          </a:p>
+        </p:txBody>
+      </p:sp>
+      <p:sp>
+        <p:nvSpPr>
+          <p:cNvPr id="3" name="Content Placeholder 2"/>
+          <p:cNvSpPr>
+            <a:spLocks noGrp="1"/>
+          </p:cNvSpPr>
+          <p:nvPr>
+            <p:ph idx="1"/>
+          </p:nvPr>
+        </p:nvSpPr>
+        <p:spPr/>
+        <p:txBody>
+          <a:bodyPr/>
+          <a:lstStyle/>
+          <a:p>
+            <a:r>
+              <a:t>Python no es la mejor opción para aplicaciones que requieran un rendimiento extremo, como aplicaciones de juegos y gráficos.</a:t>
+            </a:r>
+          </a:p>
+        </p:txBody>
+      </p:sp>
     </p:spTree>
   </p:cSld>
   <p:clrMapOvr>

</xml_diff>

<commit_message>
Arreglando problemas con variables de entorno
</commit_message>
<xml_diff>
--- a/app/temp/output.pptx
+++ b/app/temp/output.pptx
@@ -5752,7 +5752,7 @@
           <a:lstStyle/>
           <a:p>
             <a:r>
-              <a:t>Definición de Perros</a:t>
+              <a:t>Definición de gato</a:t>
             </a:r>
           </a:p>
         </p:txBody>
@@ -5773,7 +5773,7 @@
           <a:lstStyle/>
           <a:p>
             <a:r>
-              <a:t>Los perros son animales inteligentes y leales que se han domesticado desde hace mucho tiempo.</a:t>
+              <a:t>Los gatos son animales de compañía y mascotas muy populares que poseen un carácter único.</a:t>
             </a:r>
           </a:p>
         </p:txBody>
@@ -5836,7 +5836,7 @@
           <a:lstStyle/>
           <a:p>
             <a:r>
-              <a:t>Razas de Perros</a:t>
+              <a:t>Características del gato</a:t>
             </a:r>
           </a:p>
         </p:txBody>
@@ -5857,11 +5857,35 @@
           <a:lstStyle/>
           <a:p>
             <a:r>
-              <a:t>Existen muchas razas de perros, cada una con características únicas.</a:t>
-            </a:r>
-          </a:p>
-        </p:txBody>
-      </p:sp>
+              <a:t>Los gatos tienen una amplia variedad de características, desde su pelaje hasta su comportamiento.</a:t>
+            </a:r>
+          </a:p>
+        </p:txBody>
+      </p:sp>
+      <p:pic>
+        <p:nvPicPr>
+          <p:cNvPr id="4" name="Picture 3" descr="temp.jpg"/>
+          <p:cNvPicPr>
+            <a:picLocks noChangeAspect="1"/>
+          </p:cNvPicPr>
+          <p:nvPr/>
+        </p:nvPicPr>
+        <p:blipFill>
+          <a:blip r:embed="rId2"/>
+          <a:stretch>
+            <a:fillRect/>
+          </a:stretch>
+        </p:blipFill>
+        <p:spPr>
+          <a:xfrm>
+            <a:off x="3813048" y="3429000"/>
+            <a:ext cx="4572000" cy="3044952"/>
+          </a:xfrm>
+          <a:prstGeom prst="rect">
+            <a:avLst/>
+          </a:prstGeom>
+        </p:spPr>
+      </p:pic>
     </p:spTree>
   </p:cSld>
   <p:clrMapOvr>
@@ -5896,7 +5920,7 @@
           <a:lstStyle/>
           <a:p>
             <a:r>
-              <a:t>Comportamiento de los Perros</a:t>
+              <a:t>Alimentación del gato</a:t>
             </a:r>
           </a:p>
         </p:txBody>
@@ -5917,7 +5941,7 @@
           <a:lstStyle/>
           <a:p>
             <a:r>
-              <a:t>Los perros tienen un comportamiento único y pueden aprender y entender comandos.</a:t>
+              <a:t>Los gatos necesitan una alimentación balanceada para mantenerse saludables.</a:t>
             </a:r>
           </a:p>
         </p:txBody>
@@ -5980,7 +6004,7 @@
           <a:lstStyle/>
           <a:p>
             <a:r>
-              <a:t>Usos de los Perros</a:t>
+              <a:t>Cuidado y juegos del gato</a:t>
             </a:r>
           </a:p>
         </p:txBody>
@@ -6001,7 +6025,7 @@
           <a:lstStyle/>
           <a:p>
             <a:r>
-              <a:t>Los perros son usados como compañía y ayuda para personas con discapacidad, y también como guardianes.</a:t>
+              <a:t>Los gatos necesitan cuidado y juegos para desarrollarse de manera saludable.</a:t>
             </a:r>
           </a:p>
         </p:txBody>
@@ -6064,7 +6088,7 @@
           <a:lstStyle/>
           <a:p>
             <a:r>
-              <a:t>Importancia de la Conservación de los Perros</a:t>
+              <a:t>Importancia de la adopción de gatos</a:t>
             </a:r>
           </a:p>
         </p:txBody>
@@ -6085,7 +6109,7 @@
           <a:lstStyle/>
           <a:p>
             <a:r>
-              <a:t>Es importante conservar la especie de perros para preservar su diversidad genética y evitar el peligro de extinción.</a:t>
+              <a:t>La adopción de gatos es una excelente manera de contribuir a la protección de estas mascotas.</a:t>
             </a:r>
           </a:p>
         </p:txBody>
@@ -6148,7 +6172,7 @@
           <a:lstStyle/>
           <a:p>
             <a:r>
-              <a:t>Cuidado de los Perros</a:t>
+              <a:t>Diferentes razas de gatos</a:t>
             </a:r>
           </a:p>
         </p:txBody>
@@ -6169,7 +6193,7 @@
           <a:lstStyle/>
           <a:p>
             <a:r>
-              <a:t>Es importante brindarles atención y cuidado a los perros para mantenerlos saludables y felices.</a:t>
+              <a:t>Existen diferentes razas de gatos, cada una con características únicas.</a:t>
             </a:r>
           </a:p>
         </p:txBody>

</xml_diff>